<commit_message>
Fixed a couple problems
</commit_message>
<xml_diff>
--- a/rvstore_hackathon/Kubernetes-RV Store Hackathon.pptx
+++ b/rvstore_hackathon/Kubernetes-RV Store Hackathon.pptx
@@ -477,7 +477,7 @@
           <a:p>
             <a:fld id="{52C7B5E8-5650-4264-A661-2CC42BB409CD}" type="datetimeFigureOut">
               <a:rPr lang="en-US" smtClean="0"/>
-              <a:t>5/15/21</a:t>
+              <a:t>7/9/21</a:t>
             </a:fld>
             <a:endParaRPr lang="en-US"/>
           </a:p>
@@ -4122,7 +4122,7 @@
                 </a:solidFill>
                 <a:latin typeface="Raleway Medium" panose="020B0603030101060003" pitchFamily="34" charset="77"/>
               </a:rPr>
-              <a:t>BatchJob</a:t>
+              <a:t>CronJob</a:t>
             </a:r>
             <a:r>
               <a:rPr lang="en-US" sz="2400" dirty="0">
@@ -5350,7 +5350,7 @@
         <p:spPr>
           <a:xfrm>
             <a:off x="1311897" y="1168924"/>
-            <a:ext cx="9398524" cy="6678751"/>
+            <a:ext cx="9398524" cy="6709529"/>
           </a:xfrm>
           <a:prstGeom prst="rect">
             <a:avLst/>
@@ -5374,7 +5374,25 @@
                 </a:solidFill>
                 <a:latin typeface="Raleway Medium" panose="020B0603030101060003" pitchFamily="34" charset="77"/>
               </a:rPr>
-              <a:t>This is a Java Spring Boot application. It routes traffic to the appropriate application based on the path. It acts as traffic cop. For example, </a:t>
+              <a:t>This applications uses the open source project </a:t>
+            </a:r>
+            <a:r>
+              <a:rPr lang="en-US" sz="2000" dirty="0" err="1">
+                <a:solidFill>
+                  <a:schemeClr val="bg1"/>
+                </a:solidFill>
+                <a:latin typeface="Raleway Medium" panose="020B0603030101060003" pitchFamily="34" charset="77"/>
+              </a:rPr>
+              <a:t>KrakenD</a:t>
+            </a:r>
+            <a:r>
+              <a:rPr lang="en-US" sz="2000" dirty="0">
+                <a:solidFill>
+                  <a:schemeClr val="bg1"/>
+                </a:solidFill>
+                <a:latin typeface="Raleway Medium" panose="020B0603030101060003" pitchFamily="34" charset="77"/>
+              </a:rPr>
+              <a:t> from the Cloud Native Compute Foundation (the same foundation that owns Kubernetes). It routes traffic to the appropriate application based on the path. It acts as traffic cop. For example, </a:t>
             </a:r>
             <a:r>
               <a:rPr lang="en-US" sz="2000" dirty="0" err="1">
@@ -5584,42 +5602,6 @@
               </a:rPr>
               <a:t>-gateway-service</a:t>
             </a:r>
-          </a:p>
-          <a:p>
-            <a:pPr marL="342900" indent="-342900">
-              <a:buFont typeface="Arial" panose="020B0604020202020204" pitchFamily="34" charset="0"/>
-              <a:buChar char="•"/>
-            </a:pPr>
-            <a:r>
-              <a:rPr lang="en-US" sz="2000" dirty="0">
-                <a:solidFill>
-                  <a:schemeClr val="bg1"/>
-                </a:solidFill>
-                <a:latin typeface="Raleway Medium" panose="020B0603030101060003" pitchFamily="34" charset="77"/>
-              </a:rPr>
-              <a:t>Environment variables needed:</a:t>
-            </a:r>
-          </a:p>
-          <a:p>
-            <a:pPr marL="800100" lvl="1" indent="-342900">
-              <a:buFont typeface="Arial" panose="020B0604020202020204" pitchFamily="34" charset="0"/>
-              <a:buChar char="•"/>
-            </a:pPr>
-            <a:r>
-              <a:rPr lang="en-US" dirty="0">
-                <a:solidFill>
-                  <a:schemeClr val="bg1"/>
-                </a:solidFill>
-                <a:latin typeface="Raleway Medium" panose="020B0603030101060003" pitchFamily="34" charset="77"/>
-              </a:rPr>
-              <a:t>SPRING_PROFILES_ACTIVE: compose</a:t>
-            </a:r>
-            <a:endParaRPr lang="en-US" sz="2000" dirty="0">
-              <a:solidFill>
-                <a:schemeClr val="bg1"/>
-              </a:solidFill>
-              <a:latin typeface="Raleway Medium" panose="020B0603030101060003" pitchFamily="34" charset="77"/>
-            </a:endParaRPr>
           </a:p>
           <a:p>
             <a:pPr marL="800100" lvl="1" indent="-342900">
@@ -6128,7 +6110,7 @@
                 </a:solidFill>
                 <a:latin typeface="Raleway Medium" panose="020B0603030101060003" pitchFamily="34" charset="77"/>
               </a:rPr>
-              <a:t>BatchJob</a:t>
+              <a:t>CronJob</a:t>
             </a:r>
             <a:r>
               <a:rPr lang="en-US" sz="2400" dirty="0">
@@ -8800,7 +8782,7 @@
         <p:spPr>
           <a:xfrm>
             <a:off x="1311897" y="1168924"/>
-            <a:ext cx="9398524" cy="4770537"/>
+            <a:ext cx="9398524" cy="4524315"/>
           </a:xfrm>
           <a:prstGeom prst="rect">
             <a:avLst/>
@@ -8820,7 +8802,7 @@
                 </a:solidFill>
                 <a:latin typeface="Raleway Medium" panose="020B0603030101060003" pitchFamily="34" charset="77"/>
               </a:rPr>
-              <a:t>Your humble instructor is playing the role of developer. I’ve written an application made up of 6 services. But I need your expertise to get it running on Kubernetes. All I know is the application code and environment variables needed.</a:t>
+              <a:t>Your humble instructor is playing the role of developer. I’ve written an application made up of 8 services. But I need your expertise to get it running on Kubernetes. All I know is the application code and environment variables needed.</a:t>
             </a:r>
           </a:p>
           <a:p>
@@ -8854,25 +8836,7 @@
                 </a:solidFill>
                 <a:latin typeface="Raleway Medium" panose="020B0603030101060003" pitchFamily="34" charset="77"/>
               </a:rPr>
-              <a:t>Set up the application to run in Kubernetes. For this hackathon, </a:t>
-            </a:r>
-            <a:r>
-              <a:rPr lang="en-US" sz="1600" dirty="0" err="1">
-                <a:solidFill>
-                  <a:schemeClr val="bg1"/>
-                </a:solidFill>
-                <a:latin typeface="Raleway Medium" panose="020B0603030101060003" pitchFamily="34" charset="77"/>
-              </a:rPr>
-              <a:t>Minikube</a:t>
-            </a:r>
-            <a:r>
-              <a:rPr lang="en-US" sz="1600" dirty="0">
-                <a:solidFill>
-                  <a:schemeClr val="bg1"/>
-                </a:solidFill>
-                <a:latin typeface="Raleway Medium" panose="020B0603030101060003" pitchFamily="34" charset="77"/>
-              </a:rPr>
-              <a:t> or Docker Kubernetes for Desktop is fine.</a:t>
+              <a:t>Set up the application to run in Kubernetes. Just get it working completely.</a:t>
             </a:r>
           </a:p>
           <a:p>
@@ -8935,7 +8899,7 @@
                 </a:solidFill>
                 <a:latin typeface="Raleway Medium" panose="020B0603030101060003" pitchFamily="34" charset="77"/>
               </a:rPr>
-              <a:t>Make the app fault-tolerant</a:t>
+              <a:t>Make the app fault-tolerant and resilient to failure. Try to break it!</a:t>
             </a:r>
           </a:p>
           <a:p>
@@ -8950,7 +8914,7 @@
                 </a:solidFill>
                 <a:latin typeface="Raleway Medium" panose="020B0603030101060003" pitchFamily="34" charset="77"/>
               </a:rPr>
-              <a:t>Multiple copies of services</a:t>
+              <a:t>Multiple replicas of pods</a:t>
             </a:r>
           </a:p>
           <a:p>

</xml_diff>

<commit_message>
Updated smart quotes in PDF
</commit_message>
<xml_diff>
--- a/rvstore_hackathon/Kubernetes-RV Store Hackathon.pptx
+++ b/rvstore_hackathon/Kubernetes-RV Store Hackathon.pptx
@@ -477,7 +477,7 @@
           <a:p>
             <a:fld id="{52C7B5E8-5650-4264-A661-2CC42BB409CD}" type="datetimeFigureOut">
               <a:rPr lang="en-US" smtClean="0"/>
-              <a:t>7/9/21</a:t>
+              <a:t>2/10/22</a:t>
             </a:fld>
             <a:endParaRPr lang="en-US"/>
           </a:p>
@@ -3376,7 +3376,7 @@
         <p:spPr>
           <a:xfrm>
             <a:off x="1311897" y="1168924"/>
-            <a:ext cx="9398524" cy="6401753"/>
+            <a:ext cx="9398524" cy="3724096"/>
           </a:xfrm>
           <a:prstGeom prst="rect">
             <a:avLst/>
@@ -3538,7 +3538,25 @@
                 </a:solidFill>
                 <a:latin typeface="Raleway Medium" panose="020B0603030101060003" pitchFamily="34" charset="77"/>
               </a:rPr>
-              <a:t>rvstore-order-api:latest</a:t>
+              <a:t>rvstore</a:t>
+            </a:r>
+            <a:r>
+              <a:rPr lang="en-US" sz="2400" dirty="0">
+                <a:solidFill>
+                  <a:schemeClr val="bg1"/>
+                </a:solidFill>
+                <a:latin typeface="Raleway Medium" panose="020B0603030101060003" pitchFamily="34" charset="77"/>
+              </a:rPr>
+              <a:t>-order-</a:t>
+            </a:r>
+            <a:r>
+              <a:rPr lang="en-US" sz="2400" dirty="0" err="1">
+                <a:solidFill>
+                  <a:schemeClr val="bg1"/>
+                </a:solidFill>
+                <a:latin typeface="Raleway Medium" panose="020B0603030101060003" pitchFamily="34" charset="77"/>
+              </a:rPr>
+              <a:t>api</a:t>
             </a:r>
             <a:endParaRPr lang="en-US" sz="2400" dirty="0">
               <a:solidFill>
@@ -3591,67 +3609,6 @@
               </a:rPr>
               <a:t>You can test the service at http://&lt;service&gt;/orders</a:t>
             </a:r>
-          </a:p>
-          <a:p>
-            <a:pPr marL="800100" lvl="1" indent="-342900">
-              <a:buFont typeface="Arial" panose="020B0604020202020204" pitchFamily="34" charset="0"/>
-              <a:buChar char="•"/>
-            </a:pPr>
-            <a:endParaRPr lang="en-US" dirty="0"/>
-          </a:p>
-          <a:p>
-            <a:br>
-              <a:rPr lang="en-US" dirty="0"/>
-            </a:br>
-            <a:endParaRPr lang="en-US" dirty="0"/>
-          </a:p>
-          <a:p>
-            <a:pPr marL="800100" lvl="1" indent="-342900">
-              <a:buFont typeface="Arial" panose="020B0604020202020204" pitchFamily="34" charset="0"/>
-              <a:buChar char="•"/>
-            </a:pPr>
-            <a:endParaRPr lang="en-US" sz="2400" dirty="0">
-              <a:solidFill>
-                <a:schemeClr val="bg1"/>
-              </a:solidFill>
-              <a:latin typeface="Raleway Medium" panose="020B0603030101060003" pitchFamily="34" charset="77"/>
-            </a:endParaRPr>
-          </a:p>
-          <a:p>
-            <a:pPr marL="800100" lvl="1" indent="-342900">
-              <a:buFont typeface="Arial" panose="020B0604020202020204" pitchFamily="34" charset="0"/>
-              <a:buChar char="•"/>
-            </a:pPr>
-            <a:endParaRPr lang="en-US" sz="2400" dirty="0">
-              <a:solidFill>
-                <a:schemeClr val="bg1"/>
-              </a:solidFill>
-              <a:latin typeface="Raleway Medium" panose="020B0603030101060003" pitchFamily="34" charset="77"/>
-            </a:endParaRPr>
-          </a:p>
-          <a:p>
-            <a:pPr marL="342900" indent="-342900">
-              <a:buFont typeface="Arial" panose="020B0604020202020204" pitchFamily="34" charset="0"/>
-              <a:buChar char="•"/>
-            </a:pPr>
-            <a:endParaRPr lang="en-US" sz="2400" dirty="0">
-              <a:solidFill>
-                <a:schemeClr val="bg1"/>
-              </a:solidFill>
-              <a:latin typeface="Raleway Medium" panose="020B0603030101060003" pitchFamily="34" charset="77"/>
-            </a:endParaRPr>
-          </a:p>
-          <a:p>
-            <a:pPr marL="285750" indent="-285750">
-              <a:buFont typeface="Arial" panose="020B0604020202020204" pitchFamily="34" charset="0"/>
-              <a:buChar char="•"/>
-            </a:pPr>
-            <a:endParaRPr lang="en-US" sz="2400" dirty="0">
-              <a:solidFill>
-                <a:schemeClr val="bg1"/>
-              </a:solidFill>
-              <a:latin typeface="Raleway Medium" panose="020B0603030101060003" pitchFamily="34" charset="77"/>
-            </a:endParaRPr>
           </a:p>
         </p:txBody>
       </p:sp>
@@ -4900,7 +4857,7 @@
                 </a:solidFill>
                 <a:latin typeface="Raleway Medium" panose="020B0603030101060003" pitchFamily="34" charset="77"/>
               </a:rPr>
-              <a:t>-origin="*”</a:t>
+              <a:t>-origin="*"</a:t>
             </a:r>
           </a:p>
           <a:p>
@@ -4918,14 +4875,20 @@
               <a:t>http.cors.enabled</a:t>
             </a:r>
             <a:r>
-              <a:rPr lang="en-US" sz="2000" dirty="0">
-                <a:solidFill>
-                  <a:schemeClr val="bg1"/>
-                </a:solidFill>
-                <a:latin typeface="Raleway Medium" panose="020B0603030101060003" pitchFamily="34" charset="77"/>
-              </a:rPr>
-              <a:t>=“true”</a:t>
-            </a:r>
+              <a:rPr lang="en-US" sz="2000">
+                <a:solidFill>
+                  <a:schemeClr val="bg1"/>
+                </a:solidFill>
+                <a:latin typeface="Raleway Medium" panose="020B0603030101060003" pitchFamily="34" charset="77"/>
+              </a:rPr>
+              <a:t>="true"</a:t>
+            </a:r>
+            <a:endParaRPr lang="en-US" sz="2000" dirty="0">
+              <a:solidFill>
+                <a:schemeClr val="bg1"/>
+              </a:solidFill>
+              <a:latin typeface="Raleway Medium" panose="020B0603030101060003" pitchFamily="34" charset="77"/>
+            </a:endParaRPr>
           </a:p>
           <a:p>
             <a:pPr marL="800100" lvl="1" indent="-342900">
@@ -6252,7 +6215,7 @@
                 </a:solidFill>
                 <a:latin typeface="Raleway Medium" panose="020B0603030101060003" pitchFamily="34" charset="77"/>
               </a:rPr>
-              <a:t>JOB: “true”</a:t>
+              <a:t>JOB: "true"</a:t>
             </a:r>
             <a:endParaRPr lang="en-US" sz="2400" dirty="0">
               <a:solidFill>

</xml_diff>